<commit_message>
ppt update again x2
</commit_message>
<xml_diff>
--- a/CSC380 Final Presentation.pptx
+++ b/CSC380 Final Presentation.pptx
@@ -5889,7 +5889,7 @@
       </p:sp>
       <p:sp>
         <p:nvSpPr>
-          <p:cNvPr id="3" name="Text Placeholder 2"/>
+          <p:cNvPr id="5" name="Text Placeholder 4"/>
           <p:cNvSpPr>
             <a:spLocks noGrp="1"/>
           </p:cNvSpPr>
@@ -5897,53 +5897,15 @@
             <p:ph type="body" sz="quarter" idx="16"/>
           </p:nvPr>
         </p:nvSpPr>
-        <p:spPr>
-          <a:xfrm>
-            <a:off x="7082541" y="331952"/>
-            <a:ext cx="4880300" cy="2295525"/>
-          </a:xfrm>
-        </p:spPr>
+        <p:spPr/>
         <p:txBody>
           <a:bodyPr/>
           <a:lstStyle/>
           <a:p>
-            <a:r>
-              <a:rPr lang="en-US" dirty="0" smtClean="0"/>
-              <a:t>Contributions:</a:t>
-            </a:r>
-          </a:p>
-          <a:p>
-            <a:endParaRPr lang="en-US" dirty="0" smtClean="0"/>
-          </a:p>
-          <a:p>
-            <a:endParaRPr lang="en-US" dirty="0"/>
-          </a:p>
-        </p:txBody>
-      </p:sp>
-      <p:pic>
-        <p:nvPicPr>
-          <p:cNvPr id="4" name="Picture 3"/>
-          <p:cNvPicPr>
-            <a:picLocks noChangeAspect="1"/>
-          </p:cNvPicPr>
-          <p:nvPr/>
-        </p:nvPicPr>
-        <p:blipFill>
-          <a:blip r:embed="rId2"/>
-          <a:stretch>
-            <a:fillRect/>
-          </a:stretch>
-        </p:blipFill>
-        <p:spPr>
-          <a:xfrm>
-            <a:off x="6446422" y="923636"/>
-            <a:ext cx="3708400" cy="5384800"/>
-          </a:xfrm>
-          <a:prstGeom prst="rect">
-            <a:avLst/>
-          </a:prstGeom>
-        </p:spPr>
-      </p:pic>
+            <a:endParaRPr lang="en-US"/>
+          </a:p>
+        </p:txBody>
+      </p:sp>
     </p:spTree>
     <p:extLst>
       <p:ext uri="{BB962C8B-B14F-4D97-AF65-F5344CB8AC3E}">

</xml_diff>